<commit_message>
feat apresentacao pptx do projeto
</commit_message>
<xml_diff>
--- a/projeto/Apresentação - Projeto machine learning I.pptx
+++ b/projeto/Apresentação - Projeto machine learning I.pptx
@@ -32811,24 +32811,24 @@
     <we:reference id="WA200003233" version="2.0.0.3" store="WA200003233" storeType="OMEX"/>
   </we:alternateReferences>
   <we:properties>
-    <we:property name="pptInsertionSessionID" value="&quot;3B7AB186-6ACC-4E1C-9D5B-8A0045CAA0BE&quot;"/>
-    <we:property name="reportUrl" value="&quot;/groups/me/reports/27347fe4-a8b8-46af-81b3-ed2f9d71ee97/ReportSection?bookmarkGuid=a294f8c2-28fa-424d-818e-a4d1ea5ce159&amp;bookmarkUsage=1&amp;ctid=ba201131-9621-49ca-b50d-57d968b4ac35&amp;fromEntryPoint=export&quot;"/>
-    <we:property name="reportName" value="&quot;EDA - Projeto de Machine Learning I&quot;"/>
-    <we:property name="reportState" value="&quot;CONNECTED&quot;"/>
+    <we:property name="artifactViewState" value="&quot;live&quot;"/>
+    <we:property name="backgroundColor" value="&quot;#0F304A&quot;"/>
+    <we:property name="bookmark" value="&quot;H4sIAAAAAAAAA+1YzW7jNhB+FUOXvbiFZFmylNvGzRaLBkWQLNICRVCMyJHDjSQKJOXGDfw0PRR76FP4xTqk7CbOKrU3jZ0smoMA8W848803wyFvPC50XcDsRyjRO/DeV1ww4FL1Aq/vVW3noZRXJairCJI4D+OcDYZZHgALB8OUZsnaCFlp7+DGM6AmaM6FbqCwEqnzFy9MgtgPhnE+jLkPbMT8NPMu+h4UxQlM7JwcCo19r0alZQWF+B1bETRkVIPzvofXdSEV2I3ODBi0m01pOrVJweDbkPQAZsQUz5CZtvcUa6nMqt33dPvnFF0fs8LchmNZGRAVCbZ9aeTHnOVRFmaDjGdpggmz/bkozHJKNju6rhVZSbbPagvWWz6FiiH3nNIKtV7uMJZFU7q/o7X+M9kohqeYu6HKCDMjMRlUV9/kTVF4czL/REkCxw0IDhxd56X8bayQwODegT/vb9bg7WSicAIrk492oR6TlfXL4g/pRt411RLi6HOVL6hHi2pSLN1964cPrSXM6TS+BGUsz7KP5C8LO62TiqM6nDnkvxNq5chB/576z23z/GJFTFrw8Q4Dx4TCRKrWgifmxsXcDnTG3Sb6LtWiJFDsisG3cP2aS1WC6WDzRmroQjBUa6zwSqTsY38mSCFsF5FddbuxQH1r+/rf+SqPEHneKVm6Zct8mNEOHRb1vVYN37r3p0tUuHQjpc8V1d7fQ0pv7+m24bbfAjtS4RyKxiVb2uFYmNb4m7abVr05RZtVgcMbO9/Sw352JQcDHTiVkjsk0dGjW+ghaMGswFaSxmIVhZ+J04YYZc6cQ8/cvA3C3YmwFG0h6Ayhf6zeKTXbYEohirIkzAeJzxjnsY9J8iVnwc7pNpZlDUro+60fREURFfa9Y8zN02TEh+mpoeCyVy4+cSF7UNnAXc+IgW2eismlecDxQeT7/vHK889xgm1nw910FbyUw3ej6vGj6oYdVy6bcz0DQ0TprAM6E8PPuztUIQ/TYTAA9OPUz1mWDkf5SzhUURsq23tMTEXxP6kOa4GvpeEj+dGSGZOch2GUoE8cz0aDUZLj4y84z43nw5zfQ/xVi7+mWPSQNwyYsLfYx2S6V0r/V8hbYgcswGA48uMcR8kwZHSTj1wd+m/gG7w2mbxex97l/CxIoiQc8GyYxSxMRgw313574JwRtexx7EnW1LD4c+WRrz7z7zVwn+Q2yopGExWQH0J3mfIawNvytw1gP0xj4AmFnZ/6EfoYc3gJIYdlrRaftBGl7NUkRXbm+b0S+K5KJEVwrJjYoNZXkwo2Rp5RiCXUW10LvleyqZ+0qOpmwx5c655v7Oyu5y/ZGF0DwxOosOMxhjwOFbf4fsETzHz+NzsmkHIrGAAA&quot;"/>
+    <we:property name="creatorSessionId" value="&quot;83c7f7ef-0f27-47de-a6ba-65dcab31a86f&quot;"/>
+    <we:property name="creatorTenantId" value="&quot;ba201131-9621-49ca-b50d-57d968b4ac35&quot;"/>
+    <we:property name="creatorUserId" value="&quot;10032002A3CCEE71&quot;"/>
+    <we:property name="datasetId" value="&quot;d8d0c5a2-33c6-4783-9e78-084bcc23dd57&quot;"/>
     <we:property name="embedUrl" value="&quot;/reportEmbed?reportId=27347fe4-a8b8-46af-81b3-ed2f9d71ee97&amp;config=eyJjbHVzdGVyVXJsIjoiaHR0cHM6Ly9XQUJJLVNPVVRILUNFTlRSQUwtVVMtcmVkaXJlY3QuYW5hbHlzaXMud2luZG93cy5uZXQiLCJlbWJlZEZlYXR1cmVzIjp7InVzYWdlTWV0cmljc1ZOZXh0Ijp0cnVlfX0%3D&amp;disableSensitivityBanner=true&quot;"/>
-    <we:property name="pageName" value="&quot;ReportSection&quot;"/>
-    <we:property name="pageDisplayName" value="&quot;Dados demográficos&quot;"/>
-    <we:property name="datasetId" value="&quot;d8d0c5a2-33c6-4783-9e78-084bcc23dd57&quot;"/>
-    <we:property name="backgroundColor" value="&quot;#0F304A&quot;"/>
-    <we:property name="bookmark" value="&quot;H4sIAAAAAAAAA+1YwW7jNhD9FUOXvbgFZVmynNvGzRZFgyKIF2mBIihG5MjhhhIFknLjLvQ1PRR76Ff4x0pScpN4tXXrOhsXzU0kR8PHmfeGI70PGNeVgNV3UGBwEnxTMk6BSTUIg2FQtpOnUt4WoG4nMWEYpxkL48koYQTGk9xaycpwWerg5H1gQC3QXHFdg3Ae7eSP18MAhLiAhRvlIDQOgwqVliUI/gu2xnbJqBqbYYB3lZAKnMu5AYPO7dKa27GFEn4Z2R2BGr7EOVLTzl5iJZXZjIeBbp88pMdrzpnfcCZLA7y0jt0ciaYJsDSNUzIlMRJMGLj5nAvTmWSrs7tK2fPYU64qF5aZRbeQysZLBB63Qq27TWZS1IV/Ons0P5e1oniJuV8qDTcr6ymD8vaLvBYiaGwELpS08fELWFRq/UEbXshBZb1IaE1u5M8zhXZ/FpyQZvhckKwXzrCkfAes12wJJbWz25heLxYKF7BJzdlTAKaydPxZ/yr9ypu67KgQfwz52s5oXi5ER8t7vrxtT2IUYgGVY332znLKUaPZENJu+u4B875Wsq48YZ6WDZ8htdeNM4UstAqJRiwbZwmN0gnF9BhUYnglBwwHktYVrH/bZPo/z8bPqut7YD/lUhVgemK4Ux5U1NpSAdkpqNkNKLMtFKkYqtOVJ8hXXG2q8mi4Bf65U9Fcf0LUXSZWh9R1L39byYU0xHA8IUmOk3Qc0WlMYuf0r4sU3plM3j2OvfOGac6iKE6RMGDZZDRJc9wp4Be59AEr178vUQyQ1RQod73MPnqpOL7I5F+FvLuZ8mg6DkeAJJmSnGZT15kewc2E2thmekD5kv9fOqQXSu/Pj5bMU4jjLI3yUUooZSwhmO5usx4QqLVzZleb7yYb5TdKFv6F7ksvs5Y9AIdBm0fi4vD9jb3Lu/PaD0PzZxaKChTX26NveWk5Eg2Dc8zNYXLZDjzcrdBpEDZyxfoD43IAZd0V4Ptchm54yRc3Hso5tzFp6XoFonYuw5gQcm7fcklvnkN4f+8MDwUYHkvN2Ak92avcHQgdt/0N7nMhawrGEqW3gvVWhR8OWQ42sNs6EKVhQsJxko/dvxY6oWSaHcOldpAvBS04tUXqYYiDAtXC96MMDPhDVe2uHNt1yfwy+jP3avrVKWhOX3Widn+CxOam+cidNjZMZu5Rzr3dDuf+59WmXnyKEN5YH5IVffHuboqYJIzmcRZlo4xl0xRTun8//8TaO5LCddBmh3pML/3OPgXOM7hP/bI2ugKKF1Bij2wtZaBkLkH/QKxN8wekazqr6hYAAA==&quot;"/>
     <we:property name="initialStateBookmark" value="&quot;H4sIAAAAAAAAA+1YUW/bNhD+K4Ze+qINlGXJct4SLx2GpG0QD9mAIShO5MlhR4sCSXnxCv+aPQx92K/wHxtJyU3iqnPhOY2H5U0kT8ePd993POl9wLiuBCxewwyDo+CHknEKTKpeFIRB2UyevHlz9ur48uzt6+NXp3ZaVobLUgdH7wMDaormiusahHNhJ3+5DgMQ4gKmblSA0BgGFSotSxD8d2yM7ZJRNS7DAG8rIRU4lxMDBp3buTW3Y7t39G1sdwRq+BwnSE0ze4mVVGY9DgPdPHlID9ecM7/hWJYGeGkduzkSj1JgWZZkZEQSJJgycPMFF6Y1yRent5Wy57GnXFQuDmOLbiqVDZAIPG6FWrebjKWoZ/7p9MH8RNaK4iUWfqk03CyspxzKX78paiGCpY3AhZI2Pn4BZ5VafdCGz2Svsl4kNCY38rexQrs/C47IMnwqSNYLZ1hSvgXWMZtDSe3sJqbj6VThFNapOX0MwFSWjj+rP6RfeVmXLRWSTyFf2xnNy6loaXnHlx+bkxiFOIPKsT5/ZznlqLFcE9Ju+u4e875Xsq48YR6XDV8htddLZwp5ZBUS91k+yFMaZ0OK2SGoxPBK9hj2JK0rWP25zvR/no1fVdd3wN4WUs3AdMRwqzyoqLWlArITUOMbUGZTKFIxVCcLT5DvuFpX5X64Af6pU7G8/oyo20ws9qnrTv42kotohNFgSNICh9kgpqOEJM7pPxcpvDW5vH0Ye+cNs4LFcZIhYcDyYX+YFbhVwM9y6QJWrv6ao+ghqylQ7nqZXfRScXyWyb8KeXszFfFoEPUBSToiBc1Hg2FxCDcTamO75x7lc/5/6ZCeKb07PxoyjyBJ8iwu+hmhlLGUYLa9zbpHoMbOmV2tv5tslF8qOfMvtJ92ubXsABgGTR6Ji8NPN/Yub89rvwTNxyzMKlBcb47OeGk5EofBORZmP7lsBh7uRug0CBu52eoD47IHZd0W4LtcRm54yac3Hso5tzFp6HoFonYuo4QQcm7fcklfPoXwvuwM9wUYHUrN2Ao93anc7Qkdt/0N7nIhawrGEqWzgnVWhZ/3WQ7WsJs6EGdRSqJBWgxSRoAOKRnlh3Cp7eVLQQtObZG6H+Jghmrq+1EGBvyhqmZXjs26ZH4Z/Zk7Nf3iBDSnL1pRuz9BYn3TfOJOGxsmM/EoJ95ui3P/82pdLz5HCG+s98mKrni3N0VCUkaLJI/zfs7yUYYZ3b2ff2TtHUjh2muzQz2m535nlwLnGdylflkbXQHFCyixQ7aWMlAyl6AvE2voUsZzsa10uP/PH8W9XP4NHKw5qQsXAAA=&quot;"/>
     <we:property name="isFiltersActionButtonVisible" value="true"/>
     <we:property name="isVisualContainerHeaderHidden" value="false"/>
+    <we:property name="pageDisplayName" value="&quot;Dados demográficos&quot;"/>
+    <we:property name="pageName" value="&quot;ReportSection&quot;"/>
+    <we:property name="pptInsertionSessionID" value="&quot;3B7AB186-6ACC-4E1C-9D5B-8A0045CAA0BE&quot;"/>
     <we:property name="reportEmbeddedTime" value="&quot;2024-04-29T16:56:56.003Z&quot;"/>
-    <we:property name="creatorTenantId" value="&quot;ba201131-9621-49ca-b50d-57d968b4ac35&quot;"/>
-    <we:property name="creatorUserId" value="&quot;10032002A3CCEE71&quot;"/>
-    <we:property name="creatorSessionId" value="&quot;83c7f7ef-0f27-47de-a6ba-65dcab31a86f&quot;"/>
-    <we:property name="artifactViewState" value="&quot;live&quot;"/>
+    <we:property name="reportName" value="&quot;EDA - Projeto de Machine Learning I&quot;"/>
+    <we:property name="reportState" value="&quot;CONNECTED&quot;"/>
+    <we:property name="reportUrl" value="&quot;/groups/me/reports/27347fe4-a8b8-46af-81b3-ed2f9d71ee97/ReportSection?bookmarkGuid=a294f8c2-28fa-424d-818e-a4d1ea5ce159&amp;bookmarkUsage=1&amp;ctid=ba201131-9621-49ca-b50d-57d968b4ac35&amp;fromEntryPoint=export&quot;"/>
   </we:properties>
   <we:bindings/>
   <we:snapshot xmlns:r="http://schemas.openxmlformats.org/officeDocument/2006/relationships"/>
@@ -33210,15 +33210,6 @@
 </file>
 
 <file path=customXml/item2.xml><?xml version="1.0" encoding="utf-8"?>
-<?mso-contentType ?>
-<FormTemplates xmlns="http://schemas.microsoft.com/sharepoint/v3/contenttype/forms">
-  <Display>DocumentLibraryForm</Display>
-  <Edit>DocumentLibraryForm</Edit>
-  <New>DocumentLibraryForm</New>
-</FormTemplates>
-</file>
-
-<file path=customXml/item3.xml><?xml version="1.0" encoding="utf-8"?>
 <p:properties xmlns:p="http://schemas.microsoft.com/office/2006/metadata/properties" xmlns:xsi="http://www.w3.org/2001/XMLSchema-instance" xmlns:pc="http://schemas.microsoft.com/office/infopath/2007/PartnerControls">
   <documentManagement>
     <_ip_UnifiedCompliancePolicyUIAction xmlns="http://schemas.microsoft.com/sharepoint/v3" xsi:nil="true"/>
@@ -33236,6 +33227,15 @@
     <MediaServiceKeyPoints xmlns="71af3243-3dd4-4a8d-8c0d-dd76da1f02a5" xsi:nil="true"/>
   </documentManagement>
 </p:properties>
+</file>
+
+<file path=customXml/item3.xml><?xml version="1.0" encoding="utf-8"?>
+<?mso-contentType ?>
+<FormTemplates xmlns="http://schemas.microsoft.com/sharepoint/v3/contenttype/forms">
+  <Display>DocumentLibraryForm</Display>
+  <Edit>DocumentLibraryForm</Edit>
+  <New>DocumentLibraryForm</New>
+</FormTemplates>
 </file>
 
 <file path=customXml/itemProps1.xml><?xml version="1.0" encoding="utf-8"?>
@@ -33260,14 +33260,6 @@
 </file>
 
 <file path=customXml/itemProps2.xml><?xml version="1.0" encoding="utf-8"?>
-<ds:datastoreItem xmlns:ds="http://schemas.openxmlformats.org/officeDocument/2006/customXml" ds:itemID="{F8C25491-3B09-4F3E-8C86-936D290E4013}">
-  <ds:schemaRefs>
-    <ds:schemaRef ds:uri="http://schemas.microsoft.com/sharepoint/v3/contenttype/forms"/>
-  </ds:schemaRefs>
-</ds:datastoreItem>
-</file>
-
-<file path=customXml/itemProps3.xml><?xml version="1.0" encoding="utf-8"?>
 <ds:datastoreItem xmlns:ds="http://schemas.openxmlformats.org/officeDocument/2006/customXml" ds:itemID="{F4D5854E-F453-4846-A87D-6EF3DCF73E3E}">
   <ds:schemaRefs>
     <ds:schemaRef ds:uri="http://schemas.microsoft.com/office/2006/metadata/properties"/>
@@ -33279,6 +33271,14 @@
 </ds:datastoreItem>
 </file>
 
+<file path=customXml/itemProps3.xml><?xml version="1.0" encoding="utf-8"?>
+<ds:datastoreItem xmlns:ds="http://schemas.openxmlformats.org/officeDocument/2006/customXml" ds:itemID="{F8C25491-3B09-4F3E-8C86-936D290E4013}">
+  <ds:schemaRefs>
+    <ds:schemaRef ds:uri="http://schemas.microsoft.com/sharepoint/v3/contenttype/forms"/>
+  </ds:schemaRefs>
+</ds:datastoreItem>
+</file>
+
 <file path=docMetadata/LabelInfo.xml><?xml version="1.0" encoding="utf-8"?>
 <clbl:labelList xmlns:clbl="http://schemas.microsoft.com/office/2020/mipLabelMetadata"/>
 </file>
</xml_diff>